<commit_message>
/ ‘Thesis/Comprehensive Exam/Comprehensive Exam.tex’ / ‘Thesis/Comprehensive Exam/References/yazar.pptx’
</commit_message>
<xml_diff>
--- a/Thesis/Comprehensive Exam/References/yazar.pptx
+++ b/Thesis/Comprehensive Exam/References/yazar.pptx
@@ -132,6 +132,10 @@
 </p:presentation>
 </file>
 
+<file path=ppt/revisionInfo.xml><?xml version="1.0" encoding="utf-8"?>
+<p1510:revInfo xmlns:a="http://schemas.openxmlformats.org/drawingml/2006/main" xmlns:r="http://schemas.openxmlformats.org/officeDocument/2006/relationships" xmlns:p1510="http://schemas.microsoft.com/office/powerpoint/2015/10/main"/>
+</file>
+
 <file path=ppt/notesMasters/notesMaster1.xml><?xml version="1.0" encoding="utf-8"?>
 <p:notesMaster xmlns:a="http://schemas.openxmlformats.org/drawingml/2006/main" xmlns:r="http://schemas.openxmlformats.org/officeDocument/2006/relationships" xmlns:p="http://schemas.openxmlformats.org/presentationml/2006/main">
   <p:cSld>
@@ -214,7 +218,7 @@
           <a:p>
             <a:fld id="{D434D8D4-04FE-4AE5-B182-271D54AEBA39}" type="datetimeFigureOut">
               <a:rPr lang="en-US" smtClean="0"/>
-              <a:t>1/15/2018</a:t>
+              <a:t>15-Jan-18</a:t>
             </a:fld>
             <a:endParaRPr lang="en-US"/>
           </a:p>
@@ -278,38 +282,37 @@
           <a:p>
             <a:pPr lvl="0"/>
             <a:r>
-              <a:rPr lang="en-US" smtClean="0"/>
+              <a:rPr lang="en-US"/>
               <a:t>Click to edit Master text styles</a:t>
             </a:r>
           </a:p>
           <a:p>
             <a:pPr lvl="1"/>
             <a:r>
-              <a:rPr lang="en-US" smtClean="0"/>
+              <a:rPr lang="en-US"/>
               <a:t>Second level</a:t>
             </a:r>
           </a:p>
           <a:p>
             <a:pPr lvl="2"/>
             <a:r>
-              <a:rPr lang="en-US" smtClean="0"/>
+              <a:rPr lang="en-US"/>
               <a:t>Third level</a:t>
             </a:r>
           </a:p>
           <a:p>
             <a:pPr lvl="3"/>
             <a:r>
-              <a:rPr lang="en-US" smtClean="0"/>
+              <a:rPr lang="en-US"/>
               <a:t>Fourth level</a:t>
             </a:r>
           </a:p>
           <a:p>
             <a:pPr lvl="4"/>
             <a:r>
-              <a:rPr lang="en-US" smtClean="0"/>
+              <a:rPr lang="en-US"/>
               <a:t>Fifth level</a:t>
             </a:r>
-            <a:endParaRPr lang="en-US"/>
           </a:p>
         </p:txBody>
       </p:sp>
@@ -791,7 +794,7 @@
           </a:lstStyle>
           <a:p>
             <a:r>
-              <a:rPr lang="en-US" smtClean="0"/>
+              <a:rPr lang="en-US"/>
               <a:t>Click to edit Master title style</a:t>
             </a:r>
             <a:endParaRPr lang="en-US" dirty="0"/>
@@ -856,7 +859,7 @@
           </a:lstStyle>
           <a:p>
             <a:r>
-              <a:rPr lang="en-US" smtClean="0"/>
+              <a:rPr lang="en-US"/>
               <a:t>Click to edit Master subtitle style</a:t>
             </a:r>
             <a:endParaRPr lang="en-US" dirty="0"/>
@@ -880,7 +883,7 @@
           <a:p>
             <a:fld id="{6AB620DE-E9D6-47DE-9479-CA3BAEF24B0D}" type="datetimeFigureOut">
               <a:rPr lang="en-US" smtClean="0"/>
-              <a:t>1/15/2018</a:t>
+              <a:t>15-Jan-18</a:t>
             </a:fld>
             <a:endParaRPr lang="en-US"/>
           </a:p>
@@ -974,7 +977,7 @@
           <a:lstStyle/>
           <a:p>
             <a:r>
-              <a:rPr lang="en-US" smtClean="0"/>
+              <a:rPr lang="en-US"/>
               <a:t>Click to edit Master title style</a:t>
             </a:r>
             <a:endParaRPr lang="en-US" dirty="0"/>
@@ -998,35 +1001,35 @@
           <a:p>
             <a:pPr lvl="0"/>
             <a:r>
-              <a:rPr lang="en-US" smtClean="0"/>
+              <a:rPr lang="en-US"/>
               <a:t>Click to edit Master text styles</a:t>
             </a:r>
           </a:p>
           <a:p>
             <a:pPr lvl="1"/>
             <a:r>
-              <a:rPr lang="en-US" smtClean="0"/>
+              <a:rPr lang="en-US"/>
               <a:t>Second level</a:t>
             </a:r>
           </a:p>
           <a:p>
             <a:pPr lvl="2"/>
             <a:r>
-              <a:rPr lang="en-US" smtClean="0"/>
+              <a:rPr lang="en-US"/>
               <a:t>Third level</a:t>
             </a:r>
           </a:p>
           <a:p>
             <a:pPr lvl="3"/>
             <a:r>
-              <a:rPr lang="en-US" smtClean="0"/>
+              <a:rPr lang="en-US"/>
               <a:t>Fourth level</a:t>
             </a:r>
           </a:p>
           <a:p>
             <a:pPr lvl="4"/>
             <a:r>
-              <a:rPr lang="en-US" smtClean="0"/>
+              <a:rPr lang="en-US"/>
               <a:t>Fifth level</a:t>
             </a:r>
             <a:endParaRPr lang="en-US" dirty="0"/>
@@ -1050,7 +1053,7 @@
           <a:p>
             <a:fld id="{6AB620DE-E9D6-47DE-9479-CA3BAEF24B0D}" type="datetimeFigureOut">
               <a:rPr lang="en-US" smtClean="0"/>
-              <a:t>1/15/2018</a:t>
+              <a:t>15-Jan-18</a:t>
             </a:fld>
             <a:endParaRPr lang="en-US"/>
           </a:p>
@@ -1149,7 +1152,7 @@
           <a:lstStyle/>
           <a:p>
             <a:r>
-              <a:rPr lang="en-US" smtClean="0"/>
+              <a:rPr lang="en-US"/>
               <a:t>Click to edit Master title style</a:t>
             </a:r>
             <a:endParaRPr lang="en-US" dirty="0"/>
@@ -1178,35 +1181,35 @@
           <a:p>
             <a:pPr lvl="0"/>
             <a:r>
-              <a:rPr lang="en-US" smtClean="0"/>
+              <a:rPr lang="en-US"/>
               <a:t>Click to edit Master text styles</a:t>
             </a:r>
           </a:p>
           <a:p>
             <a:pPr lvl="1"/>
             <a:r>
-              <a:rPr lang="en-US" smtClean="0"/>
+              <a:rPr lang="en-US"/>
               <a:t>Second level</a:t>
             </a:r>
           </a:p>
           <a:p>
             <a:pPr lvl="2"/>
             <a:r>
-              <a:rPr lang="en-US" smtClean="0"/>
+              <a:rPr lang="en-US"/>
               <a:t>Third level</a:t>
             </a:r>
           </a:p>
           <a:p>
             <a:pPr lvl="3"/>
             <a:r>
-              <a:rPr lang="en-US" smtClean="0"/>
+              <a:rPr lang="en-US"/>
               <a:t>Fourth level</a:t>
             </a:r>
           </a:p>
           <a:p>
             <a:pPr lvl="4"/>
             <a:r>
-              <a:rPr lang="en-US" smtClean="0"/>
+              <a:rPr lang="en-US"/>
               <a:t>Fifth level</a:t>
             </a:r>
             <a:endParaRPr lang="en-US" dirty="0"/>
@@ -1230,7 +1233,7 @@
           <a:p>
             <a:fld id="{6AB620DE-E9D6-47DE-9479-CA3BAEF24B0D}" type="datetimeFigureOut">
               <a:rPr lang="en-US" smtClean="0"/>
-              <a:t>1/15/2018</a:t>
+              <a:t>15-Jan-18</a:t>
             </a:fld>
             <a:endParaRPr lang="en-US"/>
           </a:p>
@@ -1324,7 +1327,7 @@
           <a:lstStyle/>
           <a:p>
             <a:r>
-              <a:rPr lang="en-US" smtClean="0"/>
+              <a:rPr lang="en-US"/>
               <a:t>Click to edit Master title style</a:t>
             </a:r>
             <a:endParaRPr lang="en-US" dirty="0"/>
@@ -1348,35 +1351,35 @@
           <a:p>
             <a:pPr lvl="0"/>
             <a:r>
-              <a:rPr lang="en-US" smtClean="0"/>
+              <a:rPr lang="en-US"/>
               <a:t>Click to edit Master text styles</a:t>
             </a:r>
           </a:p>
           <a:p>
             <a:pPr lvl="1"/>
             <a:r>
-              <a:rPr lang="en-US" smtClean="0"/>
+              <a:rPr lang="en-US"/>
               <a:t>Second level</a:t>
             </a:r>
           </a:p>
           <a:p>
             <a:pPr lvl="2"/>
             <a:r>
-              <a:rPr lang="en-US" smtClean="0"/>
+              <a:rPr lang="en-US"/>
               <a:t>Third level</a:t>
             </a:r>
           </a:p>
           <a:p>
             <a:pPr lvl="3"/>
             <a:r>
-              <a:rPr lang="en-US" smtClean="0"/>
+              <a:rPr lang="en-US"/>
               <a:t>Fourth level</a:t>
             </a:r>
           </a:p>
           <a:p>
             <a:pPr lvl="4"/>
             <a:r>
-              <a:rPr lang="en-US" smtClean="0"/>
+              <a:rPr lang="en-US"/>
               <a:t>Fifth level</a:t>
             </a:r>
             <a:endParaRPr lang="en-US" dirty="0"/>
@@ -1400,7 +1403,7 @@
           <a:p>
             <a:fld id="{6AB620DE-E9D6-47DE-9479-CA3BAEF24B0D}" type="datetimeFigureOut">
               <a:rPr lang="en-US" smtClean="0"/>
-              <a:t>1/15/2018</a:t>
+              <a:t>15-Jan-18</a:t>
             </a:fld>
             <a:endParaRPr lang="en-US"/>
           </a:p>
@@ -1503,7 +1506,7 @@
           </a:lstStyle>
           <a:p>
             <a:r>
-              <a:rPr lang="en-US" smtClean="0"/>
+              <a:rPr lang="en-US"/>
               <a:t>Click to edit Master title style</a:t>
             </a:r>
             <a:endParaRPr lang="en-US" dirty="0"/>
@@ -1621,7 +1624,7 @@
           <a:p>
             <a:pPr lvl="0"/>
             <a:r>
-              <a:rPr lang="en-US" smtClean="0"/>
+              <a:rPr lang="en-US"/>
               <a:t>Click to edit Master text styles</a:t>
             </a:r>
           </a:p>
@@ -1644,7 +1647,7 @@
           <a:p>
             <a:fld id="{6AB620DE-E9D6-47DE-9479-CA3BAEF24B0D}" type="datetimeFigureOut">
               <a:rPr lang="en-US" smtClean="0"/>
-              <a:t>1/15/2018</a:t>
+              <a:t>15-Jan-18</a:t>
             </a:fld>
             <a:endParaRPr lang="en-US"/>
           </a:p>
@@ -1738,7 +1741,7 @@
           <a:lstStyle/>
           <a:p>
             <a:r>
-              <a:rPr lang="en-US" smtClean="0"/>
+              <a:rPr lang="en-US"/>
               <a:t>Click to edit Master title style</a:t>
             </a:r>
             <a:endParaRPr lang="en-US" dirty="0"/>
@@ -1767,35 +1770,35 @@
           <a:p>
             <a:pPr lvl="0"/>
             <a:r>
-              <a:rPr lang="en-US" smtClean="0"/>
+              <a:rPr lang="en-US"/>
               <a:t>Click to edit Master text styles</a:t>
             </a:r>
           </a:p>
           <a:p>
             <a:pPr lvl="1"/>
             <a:r>
-              <a:rPr lang="en-US" smtClean="0"/>
+              <a:rPr lang="en-US"/>
               <a:t>Second level</a:t>
             </a:r>
           </a:p>
           <a:p>
             <a:pPr lvl="2"/>
             <a:r>
-              <a:rPr lang="en-US" smtClean="0"/>
+              <a:rPr lang="en-US"/>
               <a:t>Third level</a:t>
             </a:r>
           </a:p>
           <a:p>
             <a:pPr lvl="3"/>
             <a:r>
-              <a:rPr lang="en-US" smtClean="0"/>
+              <a:rPr lang="en-US"/>
               <a:t>Fourth level</a:t>
             </a:r>
           </a:p>
           <a:p>
             <a:pPr lvl="4"/>
             <a:r>
-              <a:rPr lang="en-US" smtClean="0"/>
+              <a:rPr lang="en-US"/>
               <a:t>Fifth level</a:t>
             </a:r>
             <a:endParaRPr lang="en-US" dirty="0"/>
@@ -1824,35 +1827,35 @@
           <a:p>
             <a:pPr lvl="0"/>
             <a:r>
-              <a:rPr lang="en-US" smtClean="0"/>
+              <a:rPr lang="en-US"/>
               <a:t>Click to edit Master text styles</a:t>
             </a:r>
           </a:p>
           <a:p>
             <a:pPr lvl="1"/>
             <a:r>
-              <a:rPr lang="en-US" smtClean="0"/>
+              <a:rPr lang="en-US"/>
               <a:t>Second level</a:t>
             </a:r>
           </a:p>
           <a:p>
             <a:pPr lvl="2"/>
             <a:r>
-              <a:rPr lang="en-US" smtClean="0"/>
+              <a:rPr lang="en-US"/>
               <a:t>Third level</a:t>
             </a:r>
           </a:p>
           <a:p>
             <a:pPr lvl="3"/>
             <a:r>
-              <a:rPr lang="en-US" smtClean="0"/>
+              <a:rPr lang="en-US"/>
               <a:t>Fourth level</a:t>
             </a:r>
           </a:p>
           <a:p>
             <a:pPr lvl="4"/>
             <a:r>
-              <a:rPr lang="en-US" smtClean="0"/>
+              <a:rPr lang="en-US"/>
               <a:t>Fifth level</a:t>
             </a:r>
             <a:endParaRPr lang="en-US" dirty="0"/>
@@ -1876,7 +1879,7 @@
           <a:p>
             <a:fld id="{6AB620DE-E9D6-47DE-9479-CA3BAEF24B0D}" type="datetimeFigureOut">
               <a:rPr lang="en-US" smtClean="0"/>
-              <a:t>1/15/2018</a:t>
+              <a:t>15-Jan-18</a:t>
             </a:fld>
             <a:endParaRPr lang="en-US"/>
           </a:p>
@@ -1975,7 +1978,7 @@
           <a:lstStyle/>
           <a:p>
             <a:r>
-              <a:rPr lang="en-US" smtClean="0"/>
+              <a:rPr lang="en-US"/>
               <a:t>Click to edit Master title style</a:t>
             </a:r>
             <a:endParaRPr lang="en-US" dirty="0"/>
@@ -2041,7 +2044,7 @@
           <a:p>
             <a:pPr lvl="0"/>
             <a:r>
-              <a:rPr lang="en-US" smtClean="0"/>
+              <a:rPr lang="en-US"/>
               <a:t>Click to edit Master text styles</a:t>
             </a:r>
           </a:p>
@@ -2069,35 +2072,35 @@
           <a:p>
             <a:pPr lvl="0"/>
             <a:r>
-              <a:rPr lang="en-US" smtClean="0"/>
+              <a:rPr lang="en-US"/>
               <a:t>Click to edit Master text styles</a:t>
             </a:r>
           </a:p>
           <a:p>
             <a:pPr lvl="1"/>
             <a:r>
-              <a:rPr lang="en-US" smtClean="0"/>
+              <a:rPr lang="en-US"/>
               <a:t>Second level</a:t>
             </a:r>
           </a:p>
           <a:p>
             <a:pPr lvl="2"/>
             <a:r>
-              <a:rPr lang="en-US" smtClean="0"/>
+              <a:rPr lang="en-US"/>
               <a:t>Third level</a:t>
             </a:r>
           </a:p>
           <a:p>
             <a:pPr lvl="3"/>
             <a:r>
-              <a:rPr lang="en-US" smtClean="0"/>
+              <a:rPr lang="en-US"/>
               <a:t>Fourth level</a:t>
             </a:r>
           </a:p>
           <a:p>
             <a:pPr lvl="4"/>
             <a:r>
-              <a:rPr lang="en-US" smtClean="0"/>
+              <a:rPr lang="en-US"/>
               <a:t>Fifth level</a:t>
             </a:r>
             <a:endParaRPr lang="en-US" dirty="0"/>
@@ -2163,7 +2166,7 @@
           <a:p>
             <a:pPr lvl="0"/>
             <a:r>
-              <a:rPr lang="en-US" smtClean="0"/>
+              <a:rPr lang="en-US"/>
               <a:t>Click to edit Master text styles</a:t>
             </a:r>
           </a:p>
@@ -2191,35 +2194,35 @@
           <a:p>
             <a:pPr lvl="0"/>
             <a:r>
-              <a:rPr lang="en-US" smtClean="0"/>
+              <a:rPr lang="en-US"/>
               <a:t>Click to edit Master text styles</a:t>
             </a:r>
           </a:p>
           <a:p>
             <a:pPr lvl="1"/>
             <a:r>
-              <a:rPr lang="en-US" smtClean="0"/>
+              <a:rPr lang="en-US"/>
               <a:t>Second level</a:t>
             </a:r>
           </a:p>
           <a:p>
             <a:pPr lvl="2"/>
             <a:r>
-              <a:rPr lang="en-US" smtClean="0"/>
+              <a:rPr lang="en-US"/>
               <a:t>Third level</a:t>
             </a:r>
           </a:p>
           <a:p>
             <a:pPr lvl="3"/>
             <a:r>
-              <a:rPr lang="en-US" smtClean="0"/>
+              <a:rPr lang="en-US"/>
               <a:t>Fourth level</a:t>
             </a:r>
           </a:p>
           <a:p>
             <a:pPr lvl="4"/>
             <a:r>
-              <a:rPr lang="en-US" smtClean="0"/>
+              <a:rPr lang="en-US"/>
               <a:t>Fifth level</a:t>
             </a:r>
             <a:endParaRPr lang="en-US" dirty="0"/>
@@ -2243,7 +2246,7 @@
           <a:p>
             <a:fld id="{6AB620DE-E9D6-47DE-9479-CA3BAEF24B0D}" type="datetimeFigureOut">
               <a:rPr lang="en-US" smtClean="0"/>
-              <a:t>1/15/2018</a:t>
+              <a:t>15-Jan-18</a:t>
             </a:fld>
             <a:endParaRPr lang="en-US"/>
           </a:p>
@@ -2337,7 +2340,7 @@
           <a:lstStyle/>
           <a:p>
             <a:r>
-              <a:rPr lang="en-US" smtClean="0"/>
+              <a:rPr lang="en-US"/>
               <a:t>Click to edit Master title style</a:t>
             </a:r>
             <a:endParaRPr lang="en-US" dirty="0"/>
@@ -2361,7 +2364,7 @@
           <a:p>
             <a:fld id="{6AB620DE-E9D6-47DE-9479-CA3BAEF24B0D}" type="datetimeFigureOut">
               <a:rPr lang="en-US" smtClean="0"/>
-              <a:t>1/15/2018</a:t>
+              <a:t>15-Jan-18</a:t>
             </a:fld>
             <a:endParaRPr lang="en-US"/>
           </a:p>
@@ -2456,7 +2459,7 @@
           <a:p>
             <a:fld id="{6AB620DE-E9D6-47DE-9479-CA3BAEF24B0D}" type="datetimeFigureOut">
               <a:rPr lang="en-US" smtClean="0"/>
-              <a:t>1/15/2018</a:t>
+              <a:t>15-Jan-18</a:t>
             </a:fld>
             <a:endParaRPr lang="en-US"/>
           </a:p>
@@ -2559,7 +2562,7 @@
           </a:lstStyle>
           <a:p>
             <a:r>
-              <a:rPr lang="en-US" smtClean="0"/>
+              <a:rPr lang="en-US"/>
               <a:t>Click to edit Master title style</a:t>
             </a:r>
             <a:endParaRPr lang="en-US" dirty="0"/>
@@ -2616,35 +2619,35 @@
           <a:p>
             <a:pPr lvl="0"/>
             <a:r>
-              <a:rPr lang="en-US" smtClean="0"/>
+              <a:rPr lang="en-US"/>
               <a:t>Click to edit Master text styles</a:t>
             </a:r>
           </a:p>
           <a:p>
             <a:pPr lvl="1"/>
             <a:r>
-              <a:rPr lang="en-US" smtClean="0"/>
+              <a:rPr lang="en-US"/>
               <a:t>Second level</a:t>
             </a:r>
           </a:p>
           <a:p>
             <a:pPr lvl="2"/>
             <a:r>
-              <a:rPr lang="en-US" smtClean="0"/>
+              <a:rPr lang="en-US"/>
               <a:t>Third level</a:t>
             </a:r>
           </a:p>
           <a:p>
             <a:pPr lvl="3"/>
             <a:r>
-              <a:rPr lang="en-US" smtClean="0"/>
+              <a:rPr lang="en-US"/>
               <a:t>Fourth level</a:t>
             </a:r>
           </a:p>
           <a:p>
             <a:pPr lvl="4"/>
             <a:r>
-              <a:rPr lang="en-US" smtClean="0"/>
+              <a:rPr lang="en-US"/>
               <a:t>Fifth level</a:t>
             </a:r>
             <a:endParaRPr lang="en-US" dirty="0"/>
@@ -2710,7 +2713,7 @@
           <a:p>
             <a:pPr lvl="0"/>
             <a:r>
-              <a:rPr lang="en-US" smtClean="0"/>
+              <a:rPr lang="en-US"/>
               <a:t>Click to edit Master text styles</a:t>
             </a:r>
           </a:p>
@@ -2733,7 +2736,7 @@
           <a:p>
             <a:fld id="{6AB620DE-E9D6-47DE-9479-CA3BAEF24B0D}" type="datetimeFigureOut">
               <a:rPr lang="en-US" smtClean="0"/>
-              <a:t>1/15/2018</a:t>
+              <a:t>15-Jan-18</a:t>
             </a:fld>
             <a:endParaRPr lang="en-US"/>
           </a:p>
@@ -2836,7 +2839,7 @@
           </a:lstStyle>
           <a:p>
             <a:r>
-              <a:rPr lang="en-US" smtClean="0"/>
+              <a:rPr lang="en-US"/>
               <a:t>Click to edit Master title style</a:t>
             </a:r>
             <a:endParaRPr lang="en-US" dirty="0"/>
@@ -2901,7 +2904,7 @@
           </a:lstStyle>
           <a:p>
             <a:r>
-              <a:rPr lang="en-US" smtClean="0"/>
+              <a:rPr lang="en-US"/>
               <a:t>Click icon to add picture</a:t>
             </a:r>
             <a:endParaRPr lang="en-US" dirty="0"/>
@@ -2967,7 +2970,7 @@
           <a:p>
             <a:pPr lvl="0"/>
             <a:r>
-              <a:rPr lang="en-US" smtClean="0"/>
+              <a:rPr lang="en-US"/>
               <a:t>Click to edit Master text styles</a:t>
             </a:r>
           </a:p>
@@ -2990,7 +2993,7 @@
           <a:p>
             <a:fld id="{6AB620DE-E9D6-47DE-9479-CA3BAEF24B0D}" type="datetimeFigureOut">
               <a:rPr lang="en-US" smtClean="0"/>
-              <a:t>1/15/2018</a:t>
+              <a:t>15-Jan-18</a:t>
             </a:fld>
             <a:endParaRPr lang="en-US"/>
           </a:p>
@@ -3099,7 +3102,7 @@
           <a:lstStyle/>
           <a:p>
             <a:r>
-              <a:rPr lang="en-US" smtClean="0"/>
+              <a:rPr lang="en-US"/>
               <a:t>Click to edit Master title style</a:t>
             </a:r>
             <a:endParaRPr lang="en-US" dirty="0"/>
@@ -3133,35 +3136,35 @@
           <a:p>
             <a:pPr lvl="0"/>
             <a:r>
-              <a:rPr lang="en-US" smtClean="0"/>
+              <a:rPr lang="en-US"/>
               <a:t>Click to edit Master text styles</a:t>
             </a:r>
           </a:p>
           <a:p>
             <a:pPr lvl="1"/>
             <a:r>
-              <a:rPr lang="en-US" smtClean="0"/>
+              <a:rPr lang="en-US"/>
               <a:t>Second level</a:t>
             </a:r>
           </a:p>
           <a:p>
             <a:pPr lvl="2"/>
             <a:r>
-              <a:rPr lang="en-US" smtClean="0"/>
+              <a:rPr lang="en-US"/>
               <a:t>Third level</a:t>
             </a:r>
           </a:p>
           <a:p>
             <a:pPr lvl="3"/>
             <a:r>
-              <a:rPr lang="en-US" smtClean="0"/>
+              <a:rPr lang="en-US"/>
               <a:t>Fourth level</a:t>
             </a:r>
           </a:p>
           <a:p>
             <a:pPr lvl="4"/>
             <a:r>
-              <a:rPr lang="en-US" smtClean="0"/>
+              <a:rPr lang="en-US"/>
               <a:t>Fifth level</a:t>
             </a:r>
             <a:endParaRPr lang="en-US" dirty="0"/>
@@ -3203,7 +3206,7 @@
           <a:p>
             <a:fld id="{6AB620DE-E9D6-47DE-9479-CA3BAEF24B0D}" type="datetimeFigureOut">
               <a:rPr lang="en-US" smtClean="0"/>
-              <a:t>1/15/2018</a:t>
+              <a:t>15-Jan-18</a:t>
             </a:fld>
             <a:endParaRPr lang="en-US"/>
           </a:p>
@@ -3699,10 +3702,9 @@
           <a:lstStyle/>
           <a:p>
             <a:r>
-              <a:rPr lang="en-US" dirty="0" smtClean="0"/>
+              <a:rPr lang="en-US" dirty="0"/>
               <a:t>The role of microstructure and microtexture on the Dwell Fatigue in Titanium Alloys</a:t>
             </a:r>
-            <a:endParaRPr lang="en-US" dirty="0"/>
           </a:p>
         </p:txBody>
       </p:sp>
@@ -3729,33 +3731,33 @@
           <a:lstStyle/>
           <a:p>
             <a:r>
-              <a:rPr lang="en-US" dirty="0" smtClean="0"/>
+              <a:rPr lang="en-US" dirty="0"/>
               <a:t>Presented by </a:t>
             </a:r>
           </a:p>
           <a:p>
             <a:r>
-              <a:rPr lang="en-US" dirty="0" smtClean="0"/>
+              <a:rPr lang="en-US" dirty="0"/>
               <a:t>Yazar. K. Udayan</a:t>
             </a:r>
           </a:p>
           <a:p>
-            <a:endParaRPr lang="en-US" dirty="0" smtClean="0"/>
-          </a:p>
-          <a:p>
-            <a:r>
-              <a:rPr lang="en-US" dirty="0" smtClean="0"/>
+            <a:endParaRPr lang="en-US" dirty="0"/>
+          </a:p>
+          <a:p>
+            <a:r>
+              <a:rPr lang="en-US" dirty="0"/>
               <a:t>Under the guidance of Prof. Satyam </a:t>
             </a:r>
             <a:r>
-              <a:rPr lang="en-US" dirty="0" err="1" smtClean="0"/>
+              <a:rPr lang="en-US" dirty="0" err="1"/>
               <a:t>Suwas</a:t>
             </a:r>
-            <a:endParaRPr lang="en-US" dirty="0" smtClean="0"/>
-          </a:p>
-          <a:p>
-            <a:r>
-              <a:rPr lang="en-US" dirty="0" smtClean="0"/>
+            <a:endParaRPr lang="en-US" dirty="0"/>
+          </a:p>
+          <a:p>
+            <a:r>
+              <a:rPr lang="en-US" dirty="0"/>
               <a:t>PhD, Laboratory for Texture and Related studies</a:t>
             </a:r>
           </a:p>
@@ -3804,13 +3806,6 @@
   <p:clrMapOvr>
     <a:masterClrMapping/>
   </p:clrMapOvr>
-  <p:timing>
-    <p:tnLst>
-      <p:par>
-        <p:cTn id="1" dur="indefinite" restart="never" nodeType="tmRoot"/>
-      </p:par>
-    </p:tnLst>
-  </p:timing>
 </p:sld>
 </file>
 
@@ -3918,11 +3913,7 @@
             </a:pPr>
             <a:r>
               <a:rPr lang="en-US" sz="2100" dirty="0"/>
-              <a:t>Phenomenological aspects of </a:t>
-            </a:r>
-            <a:r>
-              <a:rPr lang="en-US" sz="2100" dirty="0"/>
-              <a:t>Dwell Fatigue </a:t>
+              <a:t>Phenomenological aspects of Dwell Fatigue </a:t>
             </a:r>
           </a:p>
           <a:p>
@@ -3948,15 +3939,7 @@
             </a:pPr>
             <a:r>
               <a:rPr lang="en-US" sz="2400" dirty="0"/>
-              <a:t>Motivation and </a:t>
-            </a:r>
-            <a:r>
-              <a:rPr lang="en-US" sz="2400" dirty="0"/>
-              <a:t>o</a:t>
-            </a:r>
-            <a:r>
-              <a:rPr lang="en-US" sz="2400" dirty="0"/>
-              <a:t>bjective </a:t>
+              <a:t>Motivation and objective </a:t>
             </a:r>
           </a:p>
           <a:p>
@@ -4053,13 +4036,6 @@
   <p:clrMapOvr>
     <a:masterClrMapping/>
   </p:clrMapOvr>
-  <p:timing>
-    <p:tnLst>
-      <p:par>
-        <p:cTn id="1" dur="indefinite" restart="never" nodeType="tmRoot"/>
-      </p:par>
-    </p:tnLst>
-  </p:timing>
 </p:sld>
 </file>
 
@@ -4103,10 +4079,9 @@
           <a:lstStyle/>
           <a:p>
             <a:r>
-              <a:rPr lang="en-US" b="1" dirty="0" smtClean="0"/>
+              <a:rPr lang="en-US" b="1" dirty="0"/>
               <a:t>What is Dwell Fatigue ?</a:t>
             </a:r>
-            <a:endParaRPr lang="en-US" b="1" dirty="0"/>
           </a:p>
         </p:txBody>
       </p:sp>
@@ -4300,8 +4275,8 @@
           </a:prstGeom>
         </p:spPr>
       </p:pic>
-      <mc:AlternateContent xmlns:mc="http://schemas.openxmlformats.org/markup-compatibility/2006">
-        <mc:Choice xmlns:a14="http://schemas.microsoft.com/office/drawing/2010/main" Requires="a14">
+      <mc:AlternateContent xmlns:mc="http://schemas.openxmlformats.org/markup-compatibility/2006" xmlns:a14="http://schemas.microsoft.com/office/drawing/2010/main">
+        <mc:Choice Requires="a14">
           <p:sp>
             <p:nvSpPr>
               <p:cNvPr id="31" name="TextBox 30"/>
@@ -4346,7 +4321,7 @@
             </p:txBody>
           </p:sp>
         </mc:Choice>
-        <mc:Fallback>
+        <mc:Fallback xmlns="">
           <p:sp>
             <p:nvSpPr>
               <p:cNvPr id="31" name="TextBox 30"/>
@@ -4542,7 +4517,6 @@
               <a:rPr lang="en-US" sz="1050" i="1" dirty="0"/>
               <a:t>Ref: Wikipedia</a:t>
             </a:r>
-            <a:endParaRPr lang="en-US" sz="1050" i="1" dirty="0"/>
           </a:p>
         </p:txBody>
       </p:sp>
@@ -4572,7 +4546,6 @@
               <a:rPr lang="en-US" sz="1050" i="1" dirty="0"/>
               <a:t>Ref: Wikipedia  </a:t>
             </a:r>
-            <a:endParaRPr lang="en-US" sz="1050" i="1" dirty="0"/>
           </a:p>
         </p:txBody>
       </p:sp>
@@ -4699,7 +4672,7 @@
           <a:graphicData uri="http://schemas.openxmlformats.org/presentationml/2006/ole">
             <mc:AlternateContent xmlns:mc="http://schemas.openxmlformats.org/markup-compatibility/2006">
               <mc:Choice xmlns:v="urn:schemas-microsoft-com:vml" Requires="v">
-                <p:oleObj spid="_x0000_s1026" name="Equation" r:id="rId4" imgW="114120" imgH="215640" progId="Equation.3">
+                <p:oleObj spid="_x0000_s1027" name="Equation" r:id="rId4" imgW="114120" imgH="215640" progId="Equation.3">
                   <p:embed/>
                 </p:oleObj>
               </mc:Choice>
@@ -4734,160 +4707,6 @@
           </a:graphicData>
         </a:graphic>
       </p:graphicFrame>
-      <p:sp>
-        <p:nvSpPr>
-          <p:cNvPr id="3" name="Rectangle 2"/>
-          <p:cNvSpPr/>
-          <p:nvPr/>
-        </p:nvSpPr>
-        <p:spPr>
-          <a:xfrm>
-            <a:off x="825794" y="5174163"/>
-            <a:ext cx="6591730" cy="1359181"/>
-          </a:xfrm>
-          <a:prstGeom prst="rect">
-            <a:avLst/>
-          </a:prstGeom>
-          <a:noFill/>
-          <a:ln>
-            <a:solidFill>
-              <a:schemeClr val="tx1"/>
-            </a:solidFill>
-          </a:ln>
-        </p:spPr>
-        <p:style>
-          <a:lnRef idx="2">
-            <a:schemeClr val="accent1">
-              <a:shade val="50000"/>
-            </a:schemeClr>
-          </a:lnRef>
-          <a:fillRef idx="1">
-            <a:schemeClr val="accent1"/>
-          </a:fillRef>
-          <a:effectRef idx="0">
-            <a:schemeClr val="accent1"/>
-          </a:effectRef>
-          <a:fontRef idx="minor">
-            <a:schemeClr val="lt1"/>
-          </a:fontRef>
-        </p:style>
-        <p:txBody>
-          <a:bodyPr rtlCol="0" anchor="ctr"/>
-          <a:lstStyle/>
-          <a:p>
-            <a:pPr marL="214313" indent="-214313">
-              <a:lnSpc>
-                <a:spcPct val="150000"/>
-              </a:lnSpc>
-              <a:buFont typeface="Wingdings" panose="05000000000000000000" pitchFamily="2" charset="2"/>
-              <a:buChar char="v"/>
-            </a:pPr>
-            <a:r>
-              <a:rPr lang="en-US" sz="1350" dirty="0">
-                <a:solidFill>
-                  <a:schemeClr val="tx1"/>
-                </a:solidFill>
-              </a:rPr>
-              <a:t>It </a:t>
-            </a:r>
-            <a:r>
-              <a:rPr lang="en-US" sz="1350" dirty="0">
-                <a:solidFill>
-                  <a:schemeClr val="tx1"/>
-                </a:solidFill>
-              </a:rPr>
-              <a:t>is often called “COLD DWELL” in </a:t>
-            </a:r>
-            <a:r>
-              <a:rPr lang="en-US" sz="1350" dirty="0">
-                <a:solidFill>
-                  <a:schemeClr val="tx1"/>
-                </a:solidFill>
-              </a:rPr>
-              <a:t>Titanium</a:t>
-            </a:r>
-          </a:p>
-          <a:p>
-            <a:pPr marL="214313" indent="-214313">
-              <a:lnSpc>
-                <a:spcPct val="150000"/>
-              </a:lnSpc>
-              <a:buFont typeface="Wingdings" panose="05000000000000000000" pitchFamily="2" charset="2"/>
-              <a:buChar char="v"/>
-            </a:pPr>
-            <a:r>
-              <a:rPr lang="el-GR" sz="1350" dirty="0">
-                <a:solidFill>
-                  <a:schemeClr val="tx1"/>
-                </a:solidFill>
-              </a:rPr>
-              <a:t>α</a:t>
-            </a:r>
-            <a:r>
-              <a:rPr lang="en-US" sz="1350" dirty="0">
-                <a:solidFill>
-                  <a:schemeClr val="tx1"/>
-                </a:solidFill>
-              </a:rPr>
-              <a:t>/near </a:t>
-            </a:r>
-            <a:r>
-              <a:rPr lang="el-GR" sz="1350" dirty="0">
-                <a:solidFill>
-                  <a:schemeClr val="tx1"/>
-                </a:solidFill>
-              </a:rPr>
-              <a:t>α</a:t>
-            </a:r>
-            <a:r>
-              <a:rPr lang="en-US" sz="1350" dirty="0">
-                <a:solidFill>
-                  <a:schemeClr val="tx1"/>
-                </a:solidFill>
-              </a:rPr>
-              <a:t> Ti alloys such as Ti-6242, IMI 685, and IMI 834 are most susceptible</a:t>
-            </a:r>
-          </a:p>
-          <a:p>
-            <a:pPr marL="214313" indent="-214313">
-              <a:lnSpc>
-                <a:spcPct val="150000"/>
-              </a:lnSpc>
-              <a:buFont typeface="Wingdings" panose="05000000000000000000" pitchFamily="2" charset="2"/>
-              <a:buChar char="v"/>
-            </a:pPr>
-            <a:r>
-              <a:rPr lang="en-US" sz="1350" dirty="0" smtClean="0">
-                <a:solidFill>
-                  <a:srgbClr val="FF0000"/>
-                </a:solidFill>
-              </a:rPr>
-              <a:t>Increased </a:t>
-            </a:r>
-            <a:r>
-              <a:rPr lang="en-US" sz="1350" dirty="0">
-                <a:solidFill>
-                  <a:srgbClr val="FF0000"/>
-                </a:solidFill>
-              </a:rPr>
-              <a:t>DFD with peak load and dwell </a:t>
-            </a:r>
-            <a:r>
-              <a:rPr lang="en-US" sz="1350" dirty="0">
-                <a:solidFill>
-                  <a:srgbClr val="FF0000"/>
-                </a:solidFill>
-              </a:rPr>
-              <a:t>time</a:t>
-            </a:r>
-            <a:endParaRPr lang="en-US" sz="1350" dirty="0">
-              <a:solidFill>
-                <a:srgbClr val="FF0000"/>
-              </a:solidFill>
-            </a:endParaRPr>
-          </a:p>
-        </p:txBody>
-      </p:sp>
       <p:grpSp>
         <p:nvGrpSpPr>
           <p:cNvPr id="10" name="Group 9"/>
@@ -4896,14 +4715,14 @@
         </p:nvGrpSpPr>
         <p:grpSpPr>
           <a:xfrm>
-            <a:off x="1520899" y="3545685"/>
-            <a:ext cx="2977435" cy="991955"/>
+            <a:off x="245481" y="3545685"/>
+            <a:ext cx="4252853" cy="2810666"/>
             <a:chOff x="269456" y="3303893"/>
             <a:chExt cx="3969913" cy="1322607"/>
           </a:xfrm>
         </p:grpSpPr>
-        <mc:AlternateContent xmlns:mc="http://schemas.openxmlformats.org/markup-compatibility/2006">
-          <mc:Choice xmlns:a14="http://schemas.microsoft.com/office/drawing/2010/main" Requires="a14">
+        <mc:AlternateContent xmlns:mc="http://schemas.openxmlformats.org/markup-compatibility/2006" xmlns:a14="http://schemas.microsoft.com/office/drawing/2010/main">
+          <mc:Choice Requires="a14">
             <p:sp>
               <p:nvSpPr>
                 <p:cNvPr id="11" name="TextBox 10"/>
@@ -5169,7 +4988,7 @@
               </p:txBody>
             </p:sp>
           </mc:Choice>
-          <mc:Fallback>
+          <mc:Fallback xmlns="">
             <p:sp>
               <p:nvSpPr>
                 <p:cNvPr id="11" name="TextBox 10"/>
@@ -5314,7 +5133,6 @@
               <a:rPr lang="en-US" sz="1350" dirty="0"/>
               <a:t>But there is creep issue </a:t>
             </a:r>
-            <a:endParaRPr lang="en-US" sz="1350" dirty="0"/>
           </a:p>
         </p:txBody>
       </p:sp>
@@ -5674,11 +5492,7 @@
             <a:p>
               <a:r>
                 <a:rPr lang="en-US" sz="1013" dirty="0"/>
-                <a:t>Fig: </a:t>
-              </a:r>
-              <a:r>
-                <a:rPr lang="en-US" sz="1013" dirty="0"/>
-                <a:t>DFD in two Ti alloys</a:t>
+                <a:t>Fig: DFD in two Ti alloys</a:t>
               </a:r>
             </a:p>
             <a:p>
@@ -5690,7 +5504,6 @@
                 <a:rPr lang="en-US" sz="1013" i="1" dirty="0"/>
                 <a:t>, 1998</a:t>
               </a:r>
-              <a:endParaRPr lang="en-US" sz="1013" i="1" dirty="0"/>
             </a:p>
           </p:txBody>
         </p:sp>
@@ -5767,13 +5580,8 @@
               </a:r>
               <a:r>
                 <a:rPr lang="en-US" sz="1013" i="1" dirty="0"/>
-                <a:t>, </a:t>
+                <a:t>, 2001</a:t>
               </a:r>
-              <a:r>
-                <a:rPr lang="en-US" sz="1013" i="1" dirty="0"/>
-                <a:t>2001</a:t>
-              </a:r>
-              <a:endParaRPr lang="en-US" sz="1013" i="1" dirty="0"/>
             </a:p>
           </p:txBody>
         </p:sp>
@@ -5812,6 +5620,82 @@
           </a:p>
         </p:txBody>
       </p:sp>
+      <p:pic>
+        <p:nvPicPr>
+          <p:cNvPr id="31" name="Picture 30">
+            <a:extLst>
+              <a:ext uri="{FF2B5EF4-FFF2-40B4-BE49-F238E27FC236}">
+                <a16:creationId xmlns:a16="http://schemas.microsoft.com/office/drawing/2014/main" id="{97AF2589-3DE3-4ABE-8FBE-EE38449AAD37}"/>
+              </a:ext>
+            </a:extLst>
+          </p:cNvPr>
+          <p:cNvPicPr>
+            <a:picLocks noChangeAspect="1"/>
+          </p:cNvPicPr>
+          <p:nvPr/>
+        </p:nvPicPr>
+        <p:blipFill>
+          <a:blip r:embed="rId10">
+            <a:extLst>
+              <a:ext uri="{28A0092B-C50C-407E-A947-70E740481C1C}">
+                <a14:useLocalDpi xmlns:a14="http://schemas.microsoft.com/office/drawing/2010/main" val="0"/>
+              </a:ext>
+            </a:extLst>
+          </a:blip>
+          <a:stretch>
+            <a:fillRect/>
+          </a:stretch>
+        </p:blipFill>
+        <p:spPr>
+          <a:xfrm>
+            <a:off x="4732517" y="3329762"/>
+            <a:ext cx="4251206" cy="2899184"/>
+          </a:xfrm>
+          <a:prstGeom prst="rect">
+            <a:avLst/>
+          </a:prstGeom>
+        </p:spPr>
+      </p:pic>
+      <p:sp>
+        <p:nvSpPr>
+          <p:cNvPr id="32" name="TextBox 31">
+            <a:extLst>
+              <a:ext uri="{FF2B5EF4-FFF2-40B4-BE49-F238E27FC236}">
+                <a16:creationId xmlns:a16="http://schemas.microsoft.com/office/drawing/2014/main" id="{374A814C-658B-4BBD-A255-4FCB63A955AF}"/>
+              </a:ext>
+            </a:extLst>
+          </p:cNvPr>
+          <p:cNvSpPr txBox="1"/>
+          <p:nvPr/>
+        </p:nvSpPr>
+        <p:spPr>
+          <a:xfrm>
+            <a:off x="5436349" y="6208249"/>
+            <a:ext cx="3528426" cy="584775"/>
+          </a:xfrm>
+          <a:prstGeom prst="rect">
+            <a:avLst/>
+          </a:prstGeom>
+          <a:noFill/>
+        </p:spPr>
+        <p:txBody>
+          <a:bodyPr wrap="square" rtlCol="0">
+            <a:spAutoFit/>
+          </a:bodyPr>
+          <a:lstStyle/>
+          <a:p>
+            <a:r>
+              <a:rPr lang="en-US" sz="1600" dirty="0"/>
+              <a:t>Fig: Perspectives on Titanium Science and Technology, D.</a:t>
+            </a:r>
+            <a:r>
+              <a:rPr lang="en-US" sz="1600" i="1" dirty="0"/>
+              <a:t> Banerjee, et.al., 2014</a:t>
+            </a:r>
+            <a:endParaRPr lang="en-US" sz="1600" dirty="0"/>
+          </a:p>
+        </p:txBody>
+      </p:sp>
     </p:spTree>
     <p:extLst>
       <p:ext uri="{BB962C8B-B14F-4D97-AF65-F5344CB8AC3E}">
@@ -5822,13 +5706,6 @@
   <p:clrMapOvr>
     <a:masterClrMapping/>
   </p:clrMapOvr>
-  <p:timing>
-    <p:tnLst>
-      <p:par>
-        <p:cTn id="1" dur="indefinite" restart="never" nodeType="tmRoot"/>
-      </p:par>
-    </p:tnLst>
-  </p:timing>
 </p:sld>
 </file>
 
@@ -5851,14 +5728,20 @@
       </p:grpSpPr>
       <p:sp>
         <p:nvSpPr>
-          <p:cNvPr id="4" name="TextBox 3"/>
+          <p:cNvPr id="2" name="TextBox 1">
+            <a:extLst>
+              <a:ext uri="{FF2B5EF4-FFF2-40B4-BE49-F238E27FC236}">
+                <a16:creationId xmlns:a16="http://schemas.microsoft.com/office/drawing/2014/main" id="{A87C955C-6657-4D55-940A-23A4D8E3103E}"/>
+              </a:ext>
+            </a:extLst>
+          </p:cNvPr>
           <p:cNvSpPr txBox="1"/>
           <p:nvPr/>
         </p:nvSpPr>
         <p:spPr>
           <a:xfrm>
-            <a:off x="4729387" y="3136612"/>
-            <a:ext cx="3528426" cy="584775"/>
+            <a:off x="424070" y="397566"/>
+            <a:ext cx="6029739" cy="369332"/>
           </a:xfrm>
           <a:prstGeom prst="rect">
             <a:avLst/>
@@ -5872,55 +5755,12 @@
           <a:lstStyle/>
           <a:p>
             <a:r>
-              <a:rPr lang="en-US" sz="1600" dirty="0" smtClean="0"/>
-              <a:t>Fig: </a:t>
-            </a:r>
-            <a:r>
-              <a:rPr lang="en-US" sz="1600" dirty="0"/>
-              <a:t>Perspectives on Titanium Science and </a:t>
-            </a:r>
-            <a:r>
-              <a:rPr lang="en-US" sz="1600" dirty="0" smtClean="0"/>
-              <a:t>Technology, D.</a:t>
-            </a:r>
-            <a:r>
-              <a:rPr lang="en-US" sz="1600" i="1" dirty="0" smtClean="0"/>
-              <a:t> Banerjee, et.al., 2014</a:t>
-            </a:r>
-            <a:endParaRPr lang="en-US" sz="1600" dirty="0"/>
-          </a:p>
-        </p:txBody>
-      </p:sp>
-      <p:pic>
-        <p:nvPicPr>
-          <p:cNvPr id="5" name="Picture 4"/>
-          <p:cNvPicPr>
-            <a:picLocks noChangeAspect="1"/>
-          </p:cNvPicPr>
-          <p:nvPr/>
-        </p:nvPicPr>
-        <p:blipFill>
-          <a:blip r:embed="rId2">
-            <a:extLst>
-              <a:ext uri="{28A0092B-C50C-407E-A947-70E740481C1C}">
-                <a14:useLocalDpi xmlns:a14="http://schemas.microsoft.com/office/drawing/2010/main" val="0"/>
-              </a:ext>
-            </a:extLst>
-          </a:blip>
-          <a:stretch>
-            <a:fillRect/>
-          </a:stretch>
-        </p:blipFill>
-        <p:spPr>
-          <a:xfrm>
-            <a:off x="4006607" y="180193"/>
-            <a:ext cx="4251206" cy="2899184"/>
-          </a:xfrm>
-          <a:prstGeom prst="rect">
-            <a:avLst/>
-          </a:prstGeom>
-        </p:spPr>
-      </p:pic>
+              <a:rPr lang="en-US" dirty="0"/>
+              <a:t>Motivation</a:t>
+            </a:r>
+          </a:p>
+        </p:txBody>
+      </p:sp>
     </p:spTree>
     <p:extLst>
       <p:ext uri="{BB962C8B-B14F-4D97-AF65-F5344CB8AC3E}">
@@ -5972,10 +5812,9 @@
           <a:lstStyle/>
           <a:p>
             <a:r>
-              <a:rPr lang="en-US" dirty="0" smtClean="0"/>
+              <a:rPr lang="en-US" dirty="0"/>
               <a:t>Experimental Studies</a:t>
             </a:r>
-            <a:endParaRPr lang="en-US" dirty="0"/>
           </a:p>
         </p:txBody>
       </p:sp>

</xml_diff>